<commit_message>
finalized materials for next class
</commit_message>
<xml_diff>
--- a/presentation/pptx/06-Time Series.pptx
+++ b/presentation/pptx/06-Time Series.pptx
@@ -5,7 +5,7 @@
     <p:sldMasterId id="2147483840" r:id="rId1"/>
   </p:sldMasterIdLst>
   <p:notesMasterIdLst>
-    <p:notesMasterId r:id="rId35"/>
+    <p:notesMasterId r:id="rId36"/>
   </p:notesMasterIdLst>
   <p:sldIdLst>
     <p:sldId id="256" r:id="rId2"/>
@@ -40,7 +40,8 @@
     <p:sldId id="339" r:id="rId31"/>
     <p:sldId id="340" r:id="rId32"/>
     <p:sldId id="341" r:id="rId33"/>
-    <p:sldId id="317" r:id="rId34"/>
+    <p:sldId id="343" r:id="rId34"/>
+    <p:sldId id="317" r:id="rId35"/>
   </p:sldIdLst>
   <p:sldSz cx="12192000" cy="6858000"/>
   <p:notesSz cx="6858000" cy="9144000"/>
@@ -774,7 +775,13 @@
                           <a:rPr lang="en-US" b="0" i="1" baseline="0" smtClean="0">
                             <a:latin typeface="Cambria Math" panose="02040503050406030204" pitchFamily="18" charset="0"/>
                           </a:rPr>
-                          <m:t>−1</m:t>
+                          <m:t>−</m:t>
+                        </m:r>
+                        <m:r>
+                          <a:rPr lang="en-US" b="0" i="1" baseline="0" smtClean="0">
+                            <a:latin typeface="Cambria Math" panose="02040503050406030204" pitchFamily="18" charset="0"/>
+                          </a:rPr>
+                          <m:t>1</m:t>
                         </m:r>
                       </m:sub>
                     </m:sSub>
@@ -813,7 +820,13 @@
                           <a:rPr lang="en-US" b="0" i="1" smtClean="0">
                             <a:latin typeface="Cambria Math" panose="02040503050406030204" pitchFamily="18" charset="0"/>
                           </a:rPr>
-                          <m:t>−1</m:t>
+                          <m:t>−</m:t>
+                        </m:r>
+                        <m:r>
+                          <a:rPr lang="en-US" b="0" i="1" smtClean="0">
+                            <a:latin typeface="Cambria Math" panose="02040503050406030204" pitchFamily="18" charset="0"/>
+                          </a:rPr>
+                          <m:t>1</m:t>
                         </m:r>
                       </m:sub>
                     </m:sSub>
@@ -868,7 +881,13 @@
                           <a:rPr lang="en-US" b="0" i="1" baseline="0" smtClean="0">
                             <a:latin typeface="Cambria Math" panose="02040503050406030204" pitchFamily="18" charset="0"/>
                           </a:rPr>
-                          <m:t>−1</m:t>
+                          <m:t>−</m:t>
+                        </m:r>
+                        <m:r>
+                          <a:rPr lang="en-US" b="0" i="1" baseline="0" smtClean="0">
+                            <a:latin typeface="Cambria Math" panose="02040503050406030204" pitchFamily="18" charset="0"/>
+                          </a:rPr>
+                          <m:t>1</m:t>
                         </m:r>
                       </m:sub>
                     </m:sSub>
@@ -905,7 +924,13 @@
                           <a:rPr lang="en-US" b="0" i="1" baseline="0" smtClean="0">
                             <a:latin typeface="Cambria Math" panose="02040503050406030204" pitchFamily="18" charset="0"/>
                           </a:rPr>
-                          <m:t>−2</m:t>
+                          <m:t>−</m:t>
+                        </m:r>
+                        <m:r>
+                          <a:rPr lang="en-US" b="0" i="1" baseline="0" smtClean="0">
+                            <a:latin typeface="Cambria Math" panose="02040503050406030204" pitchFamily="18" charset="0"/>
+                          </a:rPr>
+                          <m:t>2</m:t>
                         </m:r>
                       </m:sub>
                     </m:sSub>
@@ -8713,7 +8738,31 @@
                       <a:rPr lang="en-US" b="0" i="1" smtClean="0">
                         <a:latin typeface="Cambria Math" panose="02040503050406030204" pitchFamily="18" charset="0"/>
                       </a:rPr>
-                      <m:t>±1.96/</m:t>
+                      <m:t>±</m:t>
+                    </m:r>
+                    <m:r>
+                      <a:rPr lang="en-US" b="0" i="1" smtClean="0">
+                        <a:latin typeface="Cambria Math" panose="02040503050406030204" pitchFamily="18" charset="0"/>
+                      </a:rPr>
+                      <m:t>1</m:t>
+                    </m:r>
+                    <m:r>
+                      <a:rPr lang="en-US" b="0" i="1" smtClean="0">
+                        <a:latin typeface="Cambria Math" panose="02040503050406030204" pitchFamily="18" charset="0"/>
+                      </a:rPr>
+                      <m:t>.</m:t>
+                    </m:r>
+                    <m:r>
+                      <a:rPr lang="en-US" b="0" i="1" smtClean="0">
+                        <a:latin typeface="Cambria Math" panose="02040503050406030204" pitchFamily="18" charset="0"/>
+                      </a:rPr>
+                      <m:t>96</m:t>
+                    </m:r>
+                    <m:r>
+                      <a:rPr lang="en-US" b="0" i="1" smtClean="0">
+                        <a:latin typeface="Cambria Math" panose="02040503050406030204" pitchFamily="18" charset="0"/>
+                      </a:rPr>
+                      <m:t>/</m:t>
                     </m:r>
                     <m:rad>
                       <m:radPr>
@@ -13411,18 +13460,16 @@
         </p:spPr>
         <p:style>
           <a:lnRef idx="2">
-            <a:schemeClr val="accent2">
-              <a:shade val="50000"/>
-            </a:schemeClr>
+            <a:schemeClr val="accent2"/>
           </a:lnRef>
           <a:fillRef idx="1">
-            <a:schemeClr val="accent2"/>
+            <a:schemeClr val="lt1"/>
           </a:fillRef>
           <a:effectRef idx="0">
             <a:schemeClr val="accent2"/>
           </a:effectRef>
           <a:fontRef idx="minor">
-            <a:schemeClr val="lt1"/>
+            <a:schemeClr val="dk1"/>
           </a:fontRef>
         </p:style>
         <p:txBody>
@@ -15299,7 +15346,19 @@
                       <a:rPr lang="en-US" b="0" i="1" smtClean="0">
                         <a:latin typeface="Cambria Math" panose="02040503050406030204" pitchFamily="18" charset="0"/>
                       </a:rPr>
-                      <m:t>(2|</m:t>
+                      <m:t>(</m:t>
+                    </m:r>
+                    <m:r>
+                      <a:rPr lang="en-US" b="0" i="1" smtClean="0">
+                        <a:latin typeface="Cambria Math" panose="02040503050406030204" pitchFamily="18" charset="0"/>
+                      </a:rPr>
+                      <m:t>2</m:t>
+                    </m:r>
+                    <m:r>
+                      <a:rPr lang="en-US" b="0" i="1" smtClean="0">
+                        <a:latin typeface="Cambria Math" panose="02040503050406030204" pitchFamily="18" charset="0"/>
+                      </a:rPr>
+                      <m:t>|</m:t>
                     </m:r>
                     <m:sSub>
                       <m:sSubPr>
@@ -15638,7 +15697,13 @@
                                     <a:rPr lang="en-US" b="0" i="1" smtClean="0">
                                       <a:latin typeface="Cambria Math" panose="02040503050406030204" pitchFamily="18" charset="0"/>
                                     </a:rPr>
-                                    <m:t>+1</m:t>
+                                    <m:t>+</m:t>
+                                  </m:r>
+                                  <m:r>
+                                    <a:rPr lang="en-US" b="0" i="1" smtClean="0">
+                                      <a:latin typeface="Cambria Math" panose="02040503050406030204" pitchFamily="18" charset="0"/>
+                                    </a:rPr>
+                                    <m:t>1</m:t>
                                   </m:r>
                                 </m:sub>
                                 <m:sup>
@@ -17635,7 +17700,19 @@
                             <a:rPr lang="en-US" b="0" i="1" dirty="0" smtClean="0">
                               <a:latin typeface="Cambria Math" panose="02040503050406030204" pitchFamily="18" charset="0"/>
                             </a:rPr>
-                            <m:t>+1|</m:t>
+                            <m:t>+</m:t>
+                          </m:r>
+                          <m:r>
+                            <a:rPr lang="en-US" b="0" i="1" dirty="0" smtClean="0">
+                              <a:latin typeface="Cambria Math" panose="02040503050406030204" pitchFamily="18" charset="0"/>
+                            </a:rPr>
+                            <m:t>1</m:t>
+                          </m:r>
+                          <m:r>
+                            <a:rPr lang="en-US" b="0" i="1" dirty="0" smtClean="0">
+                              <a:latin typeface="Cambria Math" panose="02040503050406030204" pitchFamily="18" charset="0"/>
+                            </a:rPr>
+                            <m:t>|</m:t>
                           </m:r>
                           <m:r>
                             <a:rPr lang="en-US" b="0" i="1" dirty="0" smtClean="0">
@@ -17701,7 +17778,13 @@
                             <a:rPr lang="en-US" b="0" i="1" dirty="0" smtClean="0">
                               <a:latin typeface="Cambria Math" panose="02040503050406030204" pitchFamily="18" charset="0"/>
                             </a:rPr>
-                            <m:t>1−</m:t>
+                            <m:t>1</m:t>
+                          </m:r>
+                          <m:r>
+                            <a:rPr lang="en-US" b="0" i="1" dirty="0" smtClean="0">
+                              <a:latin typeface="Cambria Math" panose="02040503050406030204" pitchFamily="18" charset="0"/>
+                            </a:rPr>
+                            <m:t>−</m:t>
                           </m:r>
                           <m:r>
                             <a:rPr lang="en-US" b="0" i="1" dirty="0" smtClean="0">
@@ -17762,7 +17845,13 @@
                             <a:rPr lang="en-US" b="0" i="1" dirty="0" smtClean="0">
                               <a:latin typeface="Cambria Math" panose="02040503050406030204" pitchFamily="18" charset="0"/>
                             </a:rPr>
-                            <m:t>−1</m:t>
+                            <m:t>−</m:t>
+                          </m:r>
+                          <m:r>
+                            <a:rPr lang="en-US" b="0" i="1" dirty="0" smtClean="0">
+                              <a:latin typeface="Cambria Math" panose="02040503050406030204" pitchFamily="18" charset="0"/>
+                            </a:rPr>
+                            <m:t>1</m:t>
                           </m:r>
                         </m:sub>
                       </m:sSub>
@@ -17823,7 +17912,19 @@
                             <a:rPr lang="en-US" b="0" i="1" dirty="0" smtClean="0">
                               <a:latin typeface="Cambria Math" panose="02040503050406030204" pitchFamily="18" charset="0"/>
                             </a:rPr>
-                            <m:t>+1|</m:t>
+                            <m:t>+</m:t>
+                          </m:r>
+                          <m:r>
+                            <a:rPr lang="en-US" b="0" i="1" dirty="0" smtClean="0">
+                              <a:latin typeface="Cambria Math" panose="02040503050406030204" pitchFamily="18" charset="0"/>
+                            </a:rPr>
+                            <m:t>1</m:t>
+                          </m:r>
+                          <m:r>
+                            <a:rPr lang="en-US" b="0" i="1" dirty="0" smtClean="0">
+                              <a:latin typeface="Cambria Math" panose="02040503050406030204" pitchFamily="18" charset="0"/>
+                            </a:rPr>
+                            <m:t>|</m:t>
                           </m:r>
                           <m:r>
                             <a:rPr lang="en-US" b="0" i="1" dirty="0" smtClean="0">
@@ -17889,7 +17990,13 @@
                             <a:rPr lang="en-US" i="1" dirty="0">
                               <a:latin typeface="Cambria Math" panose="02040503050406030204" pitchFamily="18" charset="0"/>
                             </a:rPr>
-                            <m:t>1−</m:t>
+                            <m:t>1</m:t>
+                          </m:r>
+                          <m:r>
+                            <a:rPr lang="en-US" i="1" dirty="0">
+                              <a:latin typeface="Cambria Math" panose="02040503050406030204" pitchFamily="18" charset="0"/>
+                            </a:rPr>
+                            <m:t>−</m:t>
                           </m:r>
                           <m:r>
                             <a:rPr lang="en-US" i="1" dirty="0">
@@ -17950,7 +18057,13 @@
                             <a:rPr lang="en-US" i="1" dirty="0">
                               <a:latin typeface="Cambria Math" panose="02040503050406030204" pitchFamily="18" charset="0"/>
                             </a:rPr>
-                            <m:t>−1</m:t>
+                            <m:t>−</m:t>
+                          </m:r>
+                          <m:r>
+                            <a:rPr lang="en-US" i="1" dirty="0">
+                              <a:latin typeface="Cambria Math" panose="02040503050406030204" pitchFamily="18" charset="0"/>
+                            </a:rPr>
+                            <m:t>1</m:t>
                           </m:r>
                         </m:sub>
                       </m:sSub>
@@ -17996,7 +18109,13 @@
                       <a:rPr lang="en-US" b="0" i="1" smtClean="0">
                         <a:latin typeface="Cambria Math" panose="02040503050406030204" pitchFamily="18" charset="0"/>
                       </a:rPr>
-                      <m:t>0≤</m:t>
+                      <m:t>0</m:t>
+                    </m:r>
+                    <m:r>
+                      <a:rPr lang="en-US" b="0" i="1" smtClean="0">
+                        <a:latin typeface="Cambria Math" panose="02040503050406030204" pitchFamily="18" charset="0"/>
+                      </a:rPr>
+                      <m:t>≤</m:t>
                     </m:r>
                     <m:r>
                       <a:rPr lang="en-US" b="0" i="1" smtClean="0">
@@ -18008,7 +18127,13 @@
                       <a:rPr lang="en-US" b="0" i="1" smtClean="0">
                         <a:latin typeface="Cambria Math" panose="02040503050406030204" pitchFamily="18" charset="0"/>
                       </a:rPr>
-                      <m:t>≤1</m:t>
+                      <m:t>≤</m:t>
+                    </m:r>
+                    <m:r>
+                      <a:rPr lang="en-US" b="0" i="1" smtClean="0">
+                        <a:latin typeface="Cambria Math" panose="02040503050406030204" pitchFamily="18" charset="0"/>
+                      </a:rPr>
+                      <m:t>1</m:t>
                     </m:r>
                   </m:oMath>
                 </a14:m>
@@ -18363,7 +18488,19 @@
                             <a:rPr lang="en-US" b="0" i="1" dirty="0" smtClean="0">
                               <a:latin typeface="Cambria Math" panose="02040503050406030204" pitchFamily="18" charset="0"/>
                             </a:rPr>
-                            <m:t>+1|</m:t>
+                            <m:t>+</m:t>
+                          </m:r>
+                          <m:r>
+                            <a:rPr lang="en-US" b="0" i="1" dirty="0" smtClean="0">
+                              <a:latin typeface="Cambria Math" panose="02040503050406030204" pitchFamily="18" charset="0"/>
+                            </a:rPr>
+                            <m:t>1</m:t>
+                          </m:r>
+                          <m:r>
+                            <a:rPr lang="en-US" b="0" i="1" dirty="0" smtClean="0">
+                              <a:latin typeface="Cambria Math" panose="02040503050406030204" pitchFamily="18" charset="0"/>
+                            </a:rPr>
+                            <m:t>|</m:t>
                           </m:r>
                           <m:r>
                             <a:rPr lang="en-US" b="0" i="1" dirty="0" smtClean="0">
@@ -18399,7 +18536,13 @@
                             <a:rPr lang="en-US" b="0" i="1" dirty="0" smtClean="0">
                               <a:latin typeface="Cambria Math" panose="02040503050406030204" pitchFamily="18" charset="0"/>
                             </a:rPr>
-                            <m:t>=0</m:t>
+                            <m:t>=</m:t>
+                          </m:r>
+                          <m:r>
+                            <a:rPr lang="en-US" b="0" i="1" dirty="0" smtClean="0">
+                              <a:latin typeface="Cambria Math" panose="02040503050406030204" pitchFamily="18" charset="0"/>
+                            </a:rPr>
+                            <m:t>0</m:t>
                           </m:r>
                         </m:sub>
                         <m:sup>
@@ -18413,7 +18556,13 @@
                             <a:rPr lang="en-US" b="0" i="1" dirty="0" smtClean="0">
                               <a:latin typeface="Cambria Math" panose="02040503050406030204" pitchFamily="18" charset="0"/>
                             </a:rPr>
-                            <m:t>−1</m:t>
+                            <m:t>−</m:t>
+                          </m:r>
+                          <m:r>
+                            <a:rPr lang="en-US" b="0" i="1" dirty="0" smtClean="0">
+                              <a:latin typeface="Cambria Math" panose="02040503050406030204" pitchFamily="18" charset="0"/>
+                            </a:rPr>
+                            <m:t>1</m:t>
                           </m:r>
                         </m:sup>
                         <m:e>
@@ -18445,7 +18594,13 @@
                                     <a:rPr lang="en-US" b="0" i="1" dirty="0" smtClean="0">
                                       <a:latin typeface="Cambria Math" panose="02040503050406030204" pitchFamily="18" charset="0"/>
                                     </a:rPr>
-                                    <m:t>1−</m:t>
+                                    <m:t>1</m:t>
+                                  </m:r>
+                                  <m:r>
+                                    <a:rPr lang="en-US" b="0" i="1" dirty="0" smtClean="0">
+                                      <a:latin typeface="Cambria Math" panose="02040503050406030204" pitchFamily="18" charset="0"/>
+                                    </a:rPr>
+                                    <m:t>−</m:t>
                                   </m:r>
                                   <m:r>
                                     <a:rPr lang="en-US" b="0" i="1" dirty="0" smtClean="0">
@@ -18532,7 +18687,13 @@
                                 <a:rPr lang="en-US" b="0" i="1" dirty="0" smtClean="0">
                                   <a:latin typeface="Cambria Math" panose="02040503050406030204" pitchFamily="18" charset="0"/>
                                 </a:rPr>
-                                <m:t>1−</m:t>
+                                <m:t>1</m:t>
+                              </m:r>
+                              <m:r>
+                                <a:rPr lang="en-US" b="0" i="1" dirty="0" smtClean="0">
+                                  <a:latin typeface="Cambria Math" panose="02040503050406030204" pitchFamily="18" charset="0"/>
+                                </a:rPr>
+                                <m:t>−</m:t>
                               </m:r>
                               <m:r>
                                 <a:rPr lang="en-US" b="0" i="1" dirty="0" smtClean="0">
@@ -18775,7 +18936,13 @@
                           <a:rPr lang="en-US" b="0" i="1" smtClean="0">
                             <a:latin typeface="Cambria Math" panose="02040503050406030204" pitchFamily="18" charset="0"/>
                           </a:rPr>
-                          <m:t>1−</m:t>
+                          <m:t>1</m:t>
+                        </m:r>
+                        <m:r>
+                          <a:rPr lang="en-US" b="0" i="1" smtClean="0">
+                            <a:latin typeface="Cambria Math" panose="02040503050406030204" pitchFamily="18" charset="0"/>
+                          </a:rPr>
+                          <m:t>−</m:t>
                         </m:r>
                         <m:r>
                           <a:rPr lang="en-US" b="0" i="1" smtClean="0">
@@ -18812,7 +18979,13 @@
                           <a:rPr lang="en-US" b="0" i="1" smtClean="0">
                             <a:latin typeface="Cambria Math" panose="02040503050406030204" pitchFamily="18" charset="0"/>
                           </a:rPr>
-                          <m:t>−1</m:t>
+                          <m:t>−</m:t>
+                        </m:r>
+                        <m:r>
+                          <a:rPr lang="en-US" b="0" i="1" smtClean="0">
+                            <a:latin typeface="Cambria Math" panose="02040503050406030204" pitchFamily="18" charset="0"/>
+                          </a:rPr>
+                          <m:t>1</m:t>
                         </m:r>
                       </m:sub>
                     </m:sSub>
@@ -18950,7 +19123,19 @@
                             <a:rPr lang="en-US" sz="2000" b="0" i="1" dirty="0" smtClean="0">
                               <a:latin typeface="Cambria Math" panose="02040503050406030204" pitchFamily="18" charset="0"/>
                             </a:rPr>
-                            <m:t>+1|</m:t>
+                            <m:t>+</m:t>
+                          </m:r>
+                          <m:r>
+                            <a:rPr lang="en-US" sz="2000" b="0" i="1" dirty="0" smtClean="0">
+                              <a:latin typeface="Cambria Math" panose="02040503050406030204" pitchFamily="18" charset="0"/>
+                            </a:rPr>
+                            <m:t>1</m:t>
+                          </m:r>
+                          <m:r>
+                            <a:rPr lang="en-US" sz="2000" b="0" i="1" dirty="0" smtClean="0">
+                              <a:latin typeface="Cambria Math" panose="02040503050406030204" pitchFamily="18" charset="0"/>
+                            </a:rPr>
+                            <m:t>|</m:t>
                           </m:r>
                           <m:r>
                             <a:rPr lang="en-US" sz="2000" b="0" i="1" dirty="0" smtClean="0">
@@ -18976,7 +19161,31 @@
                         <a:rPr lang="en-US" sz="2000" b="0" i="1" dirty="0" smtClean="0">
                           <a:latin typeface="Cambria Math" panose="02040503050406030204" pitchFamily="18" charset="0"/>
                         </a:rPr>
-                        <m:t>=2,3,…</m:t>
+                        <m:t>=</m:t>
+                      </m:r>
+                      <m:r>
+                        <a:rPr lang="en-US" sz="2000" b="0" i="1" dirty="0" smtClean="0">
+                          <a:latin typeface="Cambria Math" panose="02040503050406030204" pitchFamily="18" charset="0"/>
+                        </a:rPr>
+                        <m:t>2</m:t>
+                      </m:r>
+                      <m:r>
+                        <a:rPr lang="en-US" sz="2000" b="0" i="1" dirty="0" smtClean="0">
+                          <a:latin typeface="Cambria Math" panose="02040503050406030204" pitchFamily="18" charset="0"/>
+                        </a:rPr>
+                        <m:t>,</m:t>
+                      </m:r>
+                      <m:r>
+                        <a:rPr lang="en-US" sz="2000" b="0" i="1" dirty="0" smtClean="0">
+                          <a:latin typeface="Cambria Math" panose="02040503050406030204" pitchFamily="18" charset="0"/>
+                        </a:rPr>
+                        <m:t>3</m:t>
+                      </m:r>
+                      <m:r>
+                        <a:rPr lang="en-US" sz="2000" b="0" i="1" dirty="0" smtClean="0">
+                          <a:latin typeface="Cambria Math" panose="02040503050406030204" pitchFamily="18" charset="0"/>
+                        </a:rPr>
+                        <m:t>,…</m:t>
                       </m:r>
                     </m:oMath>
                   </m:oMathPara>
@@ -23856,7 +24065,7 @@
         <p:spPr>
           <a:xfrm>
             <a:off x="6883400" y="2093976"/>
-            <a:ext cx="4086444" cy="3416320"/>
+            <a:ext cx="4086444" cy="4247317"/>
           </a:xfrm>
           <a:prstGeom prst="rect">
             <a:avLst/>
@@ -23895,13 +24104,28 @@
           <a:p>
             <a:r>
               <a:rPr lang="en-US" dirty="0"/>
-              <a:t>A framework for selecting models from this family is provided by the </a:t>
-            </a:r>
-            <a:r>
-              <a:rPr lang="en-US"/>
-              <a:t>ETS function </a:t>
-            </a:r>
-            <a:endParaRPr lang="en-IL" dirty="0"/>
+              <a:t>A framework for selecting models from this family is provided by the ETS function</a:t>
+            </a:r>
+          </a:p>
+          <a:p>
+            <a:endParaRPr lang="en-US" dirty="0"/>
+          </a:p>
+          <a:p>
+            <a:r>
+              <a:rPr lang="en-US" dirty="0"/>
+              <a:t>Optimization criteria determined by argument </a:t>
+            </a:r>
+            <a:r>
+              <a:rPr lang="en-US" dirty="0" err="1">
+                <a:latin typeface="Courier New" panose="02070309020205020404" pitchFamily="49" charset="0"/>
+                <a:cs typeface="Courier New" panose="02070309020205020404" pitchFamily="49" charset="0"/>
+              </a:rPr>
+              <a:t>opt_crit</a:t>
+            </a:r>
+            <a:endParaRPr lang="en-IL" dirty="0">
+              <a:latin typeface="Courier New" panose="02070309020205020404" pitchFamily="49" charset="0"/>
+              <a:cs typeface="Courier New" panose="02070309020205020404" pitchFamily="49" charset="0"/>
+            </a:endParaRPr>
           </a:p>
         </p:txBody>
       </p:sp>
@@ -23940,6 +24164,684 @@
           <p:cNvPr id="2" name="Title 1">
             <a:extLst>
               <a:ext uri="{FF2B5EF4-FFF2-40B4-BE49-F238E27FC236}">
+                <a16:creationId xmlns:a16="http://schemas.microsoft.com/office/drawing/2014/main" id="{645F7AA7-1F5F-44EA-98F8-7C7168CEC54E}"/>
+              </a:ext>
+            </a:extLst>
+          </p:cNvPr>
+          <p:cNvSpPr>
+            <a:spLocks noGrp="1"/>
+          </p:cNvSpPr>
+          <p:nvPr>
+            <p:ph type="title"/>
+          </p:nvPr>
+        </p:nvSpPr>
+        <p:spPr/>
+        <p:txBody>
+          <a:bodyPr/>
+          <a:lstStyle/>
+          <a:p>
+            <a:r>
+              <a:rPr lang="en-US" dirty="0"/>
+              <a:t>Forecast Workflow</a:t>
+            </a:r>
+            <a:endParaRPr lang="en-IL" dirty="0"/>
+          </a:p>
+        </p:txBody>
+      </p:sp>
+      <p:sp>
+        <p:nvSpPr>
+          <p:cNvPr id="4" name="Footer Placeholder 3">
+            <a:extLst>
+              <a:ext uri="{FF2B5EF4-FFF2-40B4-BE49-F238E27FC236}">
+                <a16:creationId xmlns:a16="http://schemas.microsoft.com/office/drawing/2014/main" id="{BAFC3842-2731-4B03-B9DE-5114DD286438}"/>
+              </a:ext>
+            </a:extLst>
+          </p:cNvPr>
+          <p:cNvSpPr>
+            <a:spLocks noGrp="1"/>
+          </p:cNvSpPr>
+          <p:nvPr>
+            <p:ph type="ftr" sz="quarter" idx="11"/>
+          </p:nvPr>
+        </p:nvSpPr>
+        <p:spPr/>
+        <p:txBody>
+          <a:bodyPr/>
+          <a:lstStyle/>
+          <a:p>
+            <a:r>
+              <a:rPr lang="en-US"/>
+              <a:t>Materials by Adi Sarid https://adisarid.github.io and http://www.sarid-ins.com</a:t>
+            </a:r>
+            <a:endParaRPr lang="en-US" dirty="0"/>
+          </a:p>
+        </p:txBody>
+      </p:sp>
+      <p:sp>
+        <p:nvSpPr>
+          <p:cNvPr id="5" name="Slide Number Placeholder 4">
+            <a:extLst>
+              <a:ext uri="{FF2B5EF4-FFF2-40B4-BE49-F238E27FC236}">
+                <a16:creationId xmlns:a16="http://schemas.microsoft.com/office/drawing/2014/main" id="{B0E02EBF-D7BE-4949-A724-251EE75A626E}"/>
+              </a:ext>
+            </a:extLst>
+          </p:cNvPr>
+          <p:cNvSpPr>
+            <a:spLocks noGrp="1"/>
+          </p:cNvSpPr>
+          <p:nvPr>
+            <p:ph type="sldNum" sz="quarter" idx="12"/>
+          </p:nvPr>
+        </p:nvSpPr>
+        <p:spPr/>
+        <p:txBody>
+          <a:bodyPr/>
+          <a:lstStyle/>
+          <a:p>
+            <a:fld id="{4FAB73BC-B049-4115-A692-8D63A059BFB8}" type="slidenum">
+              <a:rPr lang="en-US" smtClean="0"/>
+              <a:t>33</a:t>
+            </a:fld>
+            <a:endParaRPr lang="en-US" dirty="0"/>
+          </a:p>
+        </p:txBody>
+      </p:sp>
+      <p:sp>
+        <p:nvSpPr>
+          <p:cNvPr id="6" name="Rectangle: Rounded Corners 5">
+            <a:extLst>
+              <a:ext uri="{FF2B5EF4-FFF2-40B4-BE49-F238E27FC236}">
+                <a16:creationId xmlns:a16="http://schemas.microsoft.com/office/drawing/2014/main" id="{6D362978-096F-4D1B-A3DC-E115E2685B92}"/>
+              </a:ext>
+            </a:extLst>
+          </p:cNvPr>
+          <p:cNvSpPr/>
+          <p:nvPr/>
+        </p:nvSpPr>
+        <p:spPr>
+          <a:xfrm>
+            <a:off x="1069848" y="2216075"/>
+            <a:ext cx="1791686" cy="600150"/>
+          </a:xfrm>
+          <a:prstGeom prst="roundRect">
+            <a:avLst/>
+          </a:prstGeom>
+        </p:spPr>
+        <p:style>
+          <a:lnRef idx="2">
+            <a:schemeClr val="accent5">
+              <a:shade val="50000"/>
+            </a:schemeClr>
+          </a:lnRef>
+          <a:fillRef idx="1">
+            <a:schemeClr val="accent5"/>
+          </a:fillRef>
+          <a:effectRef idx="0">
+            <a:schemeClr val="accent5"/>
+          </a:effectRef>
+          <a:fontRef idx="minor">
+            <a:schemeClr val="lt1"/>
+          </a:fontRef>
+        </p:style>
+        <p:txBody>
+          <a:bodyPr rtlCol="0" anchor="ctr"/>
+          <a:lstStyle/>
+          <a:p>
+            <a:pPr algn="ctr"/>
+            <a:r>
+              <a:rPr lang="en-US" dirty="0"/>
+              <a:t>Problem Definition</a:t>
+            </a:r>
+            <a:endParaRPr lang="en-IL" dirty="0"/>
+          </a:p>
+        </p:txBody>
+      </p:sp>
+      <p:sp>
+        <p:nvSpPr>
+          <p:cNvPr id="7" name="Rectangle: Rounded Corners 6">
+            <a:extLst>
+              <a:ext uri="{FF2B5EF4-FFF2-40B4-BE49-F238E27FC236}">
+                <a16:creationId xmlns:a16="http://schemas.microsoft.com/office/drawing/2014/main" id="{961BDA59-A59C-4EE6-B42B-7FDA710A659D}"/>
+              </a:ext>
+            </a:extLst>
+          </p:cNvPr>
+          <p:cNvSpPr/>
+          <p:nvPr/>
+        </p:nvSpPr>
+        <p:spPr>
+          <a:xfrm>
+            <a:off x="3356117" y="2216075"/>
+            <a:ext cx="1791686" cy="600150"/>
+          </a:xfrm>
+          <a:prstGeom prst="roundRect">
+            <a:avLst/>
+          </a:prstGeom>
+        </p:spPr>
+        <p:style>
+          <a:lnRef idx="2">
+            <a:schemeClr val="accent2"/>
+          </a:lnRef>
+          <a:fillRef idx="1">
+            <a:schemeClr val="lt1"/>
+          </a:fillRef>
+          <a:effectRef idx="0">
+            <a:schemeClr val="accent2"/>
+          </a:effectRef>
+          <a:fontRef idx="minor">
+            <a:schemeClr val="dk1"/>
+          </a:fontRef>
+        </p:style>
+        <p:txBody>
+          <a:bodyPr rtlCol="0" anchor="ctr"/>
+          <a:lstStyle/>
+          <a:p>
+            <a:pPr algn="ctr"/>
+            <a:r>
+              <a:rPr lang="en-US" dirty="0"/>
+              <a:t>Information Gathering</a:t>
+            </a:r>
+            <a:endParaRPr lang="en-IL" dirty="0"/>
+          </a:p>
+        </p:txBody>
+      </p:sp>
+      <p:sp>
+        <p:nvSpPr>
+          <p:cNvPr id="8" name="Rectangle: Rounded Corners 7">
+            <a:extLst>
+              <a:ext uri="{FF2B5EF4-FFF2-40B4-BE49-F238E27FC236}">
+                <a16:creationId xmlns:a16="http://schemas.microsoft.com/office/drawing/2014/main" id="{A45AADE8-4711-4DD9-86E3-5A57E74836A7}"/>
+              </a:ext>
+            </a:extLst>
+          </p:cNvPr>
+          <p:cNvSpPr/>
+          <p:nvPr/>
+        </p:nvSpPr>
+        <p:spPr>
+          <a:xfrm>
+            <a:off x="3356117" y="3317520"/>
+            <a:ext cx="1791686" cy="600150"/>
+          </a:xfrm>
+          <a:prstGeom prst="roundRect">
+            <a:avLst/>
+          </a:prstGeom>
+        </p:spPr>
+        <p:style>
+          <a:lnRef idx="2">
+            <a:schemeClr val="accent5">
+              <a:shade val="50000"/>
+            </a:schemeClr>
+          </a:lnRef>
+          <a:fillRef idx="1">
+            <a:schemeClr val="accent5"/>
+          </a:fillRef>
+          <a:effectRef idx="0">
+            <a:schemeClr val="accent5"/>
+          </a:effectRef>
+          <a:fontRef idx="minor">
+            <a:schemeClr val="lt1"/>
+          </a:fontRef>
+        </p:style>
+        <p:txBody>
+          <a:bodyPr rtlCol="0" anchor="ctr"/>
+          <a:lstStyle/>
+          <a:p>
+            <a:pPr algn="ctr"/>
+            <a:r>
+              <a:rPr lang="en-US" dirty="0"/>
+              <a:t>Exploratory Analysis</a:t>
+            </a:r>
+            <a:endParaRPr lang="en-IL" dirty="0"/>
+          </a:p>
+        </p:txBody>
+      </p:sp>
+      <p:sp>
+        <p:nvSpPr>
+          <p:cNvPr id="9" name="Rectangle: Rounded Corners 8">
+            <a:extLst>
+              <a:ext uri="{FF2B5EF4-FFF2-40B4-BE49-F238E27FC236}">
+                <a16:creationId xmlns:a16="http://schemas.microsoft.com/office/drawing/2014/main" id="{85326A78-366C-4059-ADB0-185231B7E144}"/>
+              </a:ext>
+            </a:extLst>
+          </p:cNvPr>
+          <p:cNvSpPr/>
+          <p:nvPr/>
+        </p:nvSpPr>
+        <p:spPr>
+          <a:xfrm>
+            <a:off x="5200157" y="4418965"/>
+            <a:ext cx="1791686" cy="600150"/>
+          </a:xfrm>
+          <a:prstGeom prst="roundRect">
+            <a:avLst/>
+          </a:prstGeom>
+        </p:spPr>
+        <p:style>
+          <a:lnRef idx="2">
+            <a:schemeClr val="accent2">
+              <a:shade val="50000"/>
+            </a:schemeClr>
+          </a:lnRef>
+          <a:fillRef idx="1">
+            <a:schemeClr val="accent2"/>
+          </a:fillRef>
+          <a:effectRef idx="0">
+            <a:schemeClr val="accent2"/>
+          </a:effectRef>
+          <a:fontRef idx="minor">
+            <a:schemeClr val="lt1"/>
+          </a:fontRef>
+        </p:style>
+        <p:txBody>
+          <a:bodyPr rtlCol="0" anchor="ctr"/>
+          <a:lstStyle/>
+          <a:p>
+            <a:pPr algn="ctr"/>
+            <a:r>
+              <a:rPr lang="en-US" dirty="0"/>
+              <a:t>Model Fitting</a:t>
+            </a:r>
+            <a:endParaRPr lang="en-IL" dirty="0"/>
+          </a:p>
+        </p:txBody>
+      </p:sp>
+      <p:sp>
+        <p:nvSpPr>
+          <p:cNvPr id="10" name="Rectangle: Rounded Corners 9">
+            <a:extLst>
+              <a:ext uri="{FF2B5EF4-FFF2-40B4-BE49-F238E27FC236}">
+                <a16:creationId xmlns:a16="http://schemas.microsoft.com/office/drawing/2014/main" id="{0DA261A9-57E7-4B12-860A-F7F6679E40B7}"/>
+              </a:ext>
+            </a:extLst>
+          </p:cNvPr>
+          <p:cNvSpPr/>
+          <p:nvPr/>
+        </p:nvSpPr>
+        <p:spPr>
+          <a:xfrm>
+            <a:off x="6991843" y="5520410"/>
+            <a:ext cx="1791686" cy="600150"/>
+          </a:xfrm>
+          <a:prstGeom prst="roundRect">
+            <a:avLst/>
+          </a:prstGeom>
+        </p:spPr>
+        <p:style>
+          <a:lnRef idx="2">
+            <a:schemeClr val="accent5">
+              <a:shade val="50000"/>
+            </a:schemeClr>
+          </a:lnRef>
+          <a:fillRef idx="1">
+            <a:schemeClr val="accent5"/>
+          </a:fillRef>
+          <a:effectRef idx="0">
+            <a:schemeClr val="accent5"/>
+          </a:effectRef>
+          <a:fontRef idx="minor">
+            <a:schemeClr val="lt1"/>
+          </a:fontRef>
+        </p:style>
+        <p:txBody>
+          <a:bodyPr rtlCol="0" anchor="ctr"/>
+          <a:lstStyle/>
+          <a:p>
+            <a:pPr algn="ctr"/>
+            <a:r>
+              <a:rPr lang="en-US" dirty="0"/>
+              <a:t>Model Evaluation</a:t>
+            </a:r>
+            <a:endParaRPr lang="en-IL" dirty="0"/>
+          </a:p>
+        </p:txBody>
+      </p:sp>
+      <p:cxnSp>
+        <p:nvCxnSpPr>
+          <p:cNvPr id="12" name="Straight Arrow Connector 11">
+            <a:extLst>
+              <a:ext uri="{FF2B5EF4-FFF2-40B4-BE49-F238E27FC236}">
+                <a16:creationId xmlns:a16="http://schemas.microsoft.com/office/drawing/2014/main" id="{BE573011-0788-460E-A607-00E496C89604}"/>
+              </a:ext>
+            </a:extLst>
+          </p:cNvPr>
+          <p:cNvCxnSpPr>
+            <a:stCxn id="6" idx="3"/>
+            <a:endCxn id="7" idx="1"/>
+          </p:cNvCxnSpPr>
+          <p:nvPr/>
+        </p:nvCxnSpPr>
+        <p:spPr>
+          <a:xfrm>
+            <a:off x="2861534" y="2516150"/>
+            <a:ext cx="494583" cy="0"/>
+          </a:xfrm>
+          <a:prstGeom prst="straightConnector1">
+            <a:avLst/>
+          </a:prstGeom>
+          <a:ln>
+            <a:tailEnd type="triangle"/>
+          </a:ln>
+        </p:spPr>
+        <p:style>
+          <a:lnRef idx="1">
+            <a:schemeClr val="dk1"/>
+          </a:lnRef>
+          <a:fillRef idx="0">
+            <a:schemeClr val="dk1"/>
+          </a:fillRef>
+          <a:effectRef idx="0">
+            <a:schemeClr val="dk1"/>
+          </a:effectRef>
+          <a:fontRef idx="minor">
+            <a:schemeClr val="tx1"/>
+          </a:fontRef>
+        </p:style>
+      </p:cxnSp>
+      <p:cxnSp>
+        <p:nvCxnSpPr>
+          <p:cNvPr id="14" name="Straight Arrow Connector 13">
+            <a:extLst>
+              <a:ext uri="{FF2B5EF4-FFF2-40B4-BE49-F238E27FC236}">
+                <a16:creationId xmlns:a16="http://schemas.microsoft.com/office/drawing/2014/main" id="{E715AFB1-23BD-4292-9FBA-36A19A6C76A2}"/>
+              </a:ext>
+            </a:extLst>
+          </p:cNvPr>
+          <p:cNvCxnSpPr>
+            <a:stCxn id="7" idx="2"/>
+            <a:endCxn id="8" idx="0"/>
+          </p:cNvCxnSpPr>
+          <p:nvPr/>
+        </p:nvCxnSpPr>
+        <p:spPr>
+          <a:xfrm>
+            <a:off x="4251960" y="2816225"/>
+            <a:ext cx="0" cy="501295"/>
+          </a:xfrm>
+          <a:prstGeom prst="straightConnector1">
+            <a:avLst/>
+          </a:prstGeom>
+          <a:ln>
+            <a:tailEnd type="triangle"/>
+          </a:ln>
+        </p:spPr>
+        <p:style>
+          <a:lnRef idx="1">
+            <a:schemeClr val="dk1"/>
+          </a:lnRef>
+          <a:fillRef idx="0">
+            <a:schemeClr val="dk1"/>
+          </a:fillRef>
+          <a:effectRef idx="0">
+            <a:schemeClr val="dk1"/>
+          </a:effectRef>
+          <a:fontRef idx="minor">
+            <a:schemeClr val="tx1"/>
+          </a:fontRef>
+        </p:style>
+      </p:cxnSp>
+      <p:cxnSp>
+        <p:nvCxnSpPr>
+          <p:cNvPr id="16" name="Connector: Elbow 15">
+            <a:extLst>
+              <a:ext uri="{FF2B5EF4-FFF2-40B4-BE49-F238E27FC236}">
+                <a16:creationId xmlns:a16="http://schemas.microsoft.com/office/drawing/2014/main" id="{580A75FC-3B29-4E17-B63C-2BE9EDDEE83D}"/>
+              </a:ext>
+            </a:extLst>
+          </p:cNvPr>
+          <p:cNvCxnSpPr>
+            <a:stCxn id="8" idx="2"/>
+            <a:endCxn id="9" idx="1"/>
+          </p:cNvCxnSpPr>
+          <p:nvPr/>
+        </p:nvCxnSpPr>
+        <p:spPr>
+          <a:xfrm rot="16200000" flipH="1">
+            <a:off x="4325373" y="3844256"/>
+            <a:ext cx="801370" cy="948197"/>
+          </a:xfrm>
+          <a:prstGeom prst="bentConnector2">
+            <a:avLst/>
+          </a:prstGeom>
+          <a:ln>
+            <a:tailEnd type="triangle"/>
+          </a:ln>
+        </p:spPr>
+        <p:style>
+          <a:lnRef idx="1">
+            <a:schemeClr val="dk1"/>
+          </a:lnRef>
+          <a:fillRef idx="0">
+            <a:schemeClr val="dk1"/>
+          </a:fillRef>
+          <a:effectRef idx="0">
+            <a:schemeClr val="dk1"/>
+          </a:effectRef>
+          <a:fontRef idx="minor">
+            <a:schemeClr val="tx1"/>
+          </a:fontRef>
+        </p:style>
+      </p:cxnSp>
+      <p:cxnSp>
+        <p:nvCxnSpPr>
+          <p:cNvPr id="18" name="Connector: Elbow 17">
+            <a:extLst>
+              <a:ext uri="{FF2B5EF4-FFF2-40B4-BE49-F238E27FC236}">
+                <a16:creationId xmlns:a16="http://schemas.microsoft.com/office/drawing/2014/main" id="{13822DCE-1AC1-416E-AACE-4BB49190C43A}"/>
+              </a:ext>
+            </a:extLst>
+          </p:cNvPr>
+          <p:cNvCxnSpPr>
+            <a:stCxn id="9" idx="2"/>
+            <a:endCxn id="10" idx="1"/>
+          </p:cNvCxnSpPr>
+          <p:nvPr/>
+        </p:nvCxnSpPr>
+        <p:spPr>
+          <a:xfrm rot="16200000" flipH="1">
+            <a:off x="6143236" y="4971878"/>
+            <a:ext cx="801370" cy="895843"/>
+          </a:xfrm>
+          <a:prstGeom prst="bentConnector2">
+            <a:avLst/>
+          </a:prstGeom>
+          <a:ln>
+            <a:tailEnd type="triangle"/>
+          </a:ln>
+        </p:spPr>
+        <p:style>
+          <a:lnRef idx="1">
+            <a:schemeClr val="dk1"/>
+          </a:lnRef>
+          <a:fillRef idx="0">
+            <a:schemeClr val="dk1"/>
+          </a:fillRef>
+          <a:effectRef idx="0">
+            <a:schemeClr val="dk1"/>
+          </a:effectRef>
+          <a:fontRef idx="minor">
+            <a:schemeClr val="tx1"/>
+          </a:fontRef>
+        </p:style>
+      </p:cxnSp>
+      <p:sp>
+        <p:nvSpPr>
+          <p:cNvPr id="19" name="TextBox 18">
+            <a:extLst>
+              <a:ext uri="{FF2B5EF4-FFF2-40B4-BE49-F238E27FC236}">
+                <a16:creationId xmlns:a16="http://schemas.microsoft.com/office/drawing/2014/main" id="{FA9EE3A9-75ED-49B1-BB13-DEF618944A5F}"/>
+              </a:ext>
+            </a:extLst>
+          </p:cNvPr>
+          <p:cNvSpPr txBox="1"/>
+          <p:nvPr/>
+        </p:nvSpPr>
+        <p:spPr>
+          <a:xfrm>
+            <a:off x="5591737" y="3155930"/>
+            <a:ext cx="3646838" cy="923330"/>
+          </a:xfrm>
+          <a:prstGeom prst="rect">
+            <a:avLst/>
+          </a:prstGeom>
+          <a:noFill/>
+        </p:spPr>
+        <p:txBody>
+          <a:bodyPr wrap="square" rtlCol="0">
+            <a:spAutoFit/>
+          </a:bodyPr>
+          <a:lstStyle/>
+          <a:p>
+            <a:r>
+              <a:rPr lang="en-US" dirty="0"/>
+              <a:t>Visualizations, Business Cycles, Seasonality, Outliers,</a:t>
+            </a:r>
+          </a:p>
+          <a:p>
+            <a:r>
+              <a:rPr lang="en-US" dirty="0"/>
+              <a:t>Variable relationships</a:t>
+            </a:r>
+          </a:p>
+        </p:txBody>
+      </p:sp>
+      <p:sp>
+        <p:nvSpPr>
+          <p:cNvPr id="21" name="TextBox 20">
+            <a:extLst>
+              <a:ext uri="{FF2B5EF4-FFF2-40B4-BE49-F238E27FC236}">
+                <a16:creationId xmlns:a16="http://schemas.microsoft.com/office/drawing/2014/main" id="{43229774-5AB6-4919-9321-1417E2C785A4}"/>
+              </a:ext>
+            </a:extLst>
+          </p:cNvPr>
+          <p:cNvSpPr txBox="1"/>
+          <p:nvPr/>
+        </p:nvSpPr>
+        <p:spPr>
+          <a:xfrm>
+            <a:off x="7415784" y="4257375"/>
+            <a:ext cx="3646838" cy="923330"/>
+          </a:xfrm>
+          <a:prstGeom prst="rect">
+            <a:avLst/>
+          </a:prstGeom>
+          <a:noFill/>
+        </p:spPr>
+        <p:txBody>
+          <a:bodyPr wrap="square" rtlCol="0">
+            <a:spAutoFit/>
+          </a:bodyPr>
+          <a:lstStyle/>
+          <a:p>
+            <a:r>
+              <a:rPr lang="en-US" b="1" dirty="0">
+                <a:solidFill>
+                  <a:srgbClr val="00B050"/>
+                </a:solidFill>
+              </a:rPr>
+              <a:t>Baseline models</a:t>
+            </a:r>
+            <a:r>
+              <a:rPr lang="en-US" b="1" dirty="0"/>
+              <a:t>,</a:t>
+            </a:r>
+            <a:r>
+              <a:rPr lang="en-US" dirty="0"/>
+              <a:t> </a:t>
+            </a:r>
+            <a:r>
+              <a:rPr lang="en-US" b="1" dirty="0">
+                <a:solidFill>
+                  <a:srgbClr val="00B050"/>
+                </a:solidFill>
+              </a:rPr>
+              <a:t>Exponential Smoothing</a:t>
+            </a:r>
+            <a:r>
+              <a:rPr lang="en-US" b="1" dirty="0"/>
+              <a:t>, </a:t>
+            </a:r>
+            <a:r>
+              <a:rPr lang="en-US" dirty="0"/>
+              <a:t>ARIMA, Hierarchical, etc.</a:t>
+            </a:r>
+          </a:p>
+        </p:txBody>
+      </p:sp>
+      <p:sp>
+        <p:nvSpPr>
+          <p:cNvPr id="22" name="TextBox 21">
+            <a:extLst>
+              <a:ext uri="{FF2B5EF4-FFF2-40B4-BE49-F238E27FC236}">
+                <a16:creationId xmlns:a16="http://schemas.microsoft.com/office/drawing/2014/main" id="{6DD2193A-C6C7-420F-8914-74A47867BD8D}"/>
+              </a:ext>
+            </a:extLst>
+          </p:cNvPr>
+          <p:cNvSpPr txBox="1"/>
+          <p:nvPr/>
+        </p:nvSpPr>
+        <p:spPr>
+          <a:xfrm>
+            <a:off x="8927170" y="5497319"/>
+            <a:ext cx="3116276" cy="646331"/>
+          </a:xfrm>
+          <a:prstGeom prst="rect">
+            <a:avLst/>
+          </a:prstGeom>
+          <a:noFill/>
+        </p:spPr>
+        <p:txBody>
+          <a:bodyPr wrap="square" rtlCol="0">
+            <a:spAutoFit/>
+          </a:bodyPr>
+          <a:lstStyle/>
+          <a:p>
+            <a:r>
+              <a:rPr lang="en-US" dirty="0"/>
+              <a:t>MAPE, MASE, RMSE, etc.</a:t>
+            </a:r>
+          </a:p>
+          <a:p>
+            <a:r>
+              <a:rPr lang="en-US" dirty="0"/>
+              <a:t>Train/Test</a:t>
+            </a:r>
+          </a:p>
+        </p:txBody>
+      </p:sp>
+    </p:spTree>
+    <p:extLst>
+      <p:ext uri="{BB962C8B-B14F-4D97-AF65-F5344CB8AC3E}">
+        <p14:creationId xmlns:p14="http://schemas.microsoft.com/office/powerpoint/2010/main" val="1762483606"/>
+      </p:ext>
+    </p:extLst>
+  </p:cSld>
+  <p:clrMapOvr>
+    <a:masterClrMapping/>
+  </p:clrMapOvr>
+</p:sld>
+</file>
+
+<file path=ppt/slides/slide34.xml><?xml version="1.0" encoding="utf-8"?>
+<p:sld xmlns:a="http://schemas.openxmlformats.org/drawingml/2006/main" xmlns:r="http://schemas.openxmlformats.org/officeDocument/2006/relationships" xmlns:p="http://schemas.openxmlformats.org/presentationml/2006/main">
+  <p:cSld>
+    <p:spTree>
+      <p:nvGrpSpPr>
+        <p:cNvPr id="1" name=""/>
+        <p:cNvGrpSpPr/>
+        <p:nvPr/>
+      </p:nvGrpSpPr>
+      <p:grpSpPr>
+        <a:xfrm>
+          <a:off x="0" y="0"/>
+          <a:ext cx="0" cy="0"/>
+          <a:chOff x="0" y="0"/>
+          <a:chExt cx="0" cy="0"/>
+        </a:xfrm>
+      </p:grpSpPr>
+      <p:sp>
+        <p:nvSpPr>
+          <p:cNvPr id="2" name="Title 1">
+            <a:extLst>
+              <a:ext uri="{FF2B5EF4-FFF2-40B4-BE49-F238E27FC236}">
                 <a16:creationId xmlns:a16="http://schemas.microsoft.com/office/drawing/2014/main" id="{485D583A-ABCC-49E7-B0EF-E224A2B29415}"/>
               </a:ext>
             </a:extLst>
@@ -23991,6 +24893,15 @@
               </a:rPr>
               <a:t>https://otexts.com/fpp3/</a:t>
             </a:r>
+            <a:endParaRPr lang="en-US" dirty="0"/>
+          </a:p>
+          <a:p>
+            <a:r>
+              <a:rPr lang="en-US" dirty="0">
+                <a:hlinkClick r:id="rId3"/>
+              </a:rPr>
+              <a:t>https://tidyverts.org/</a:t>
+            </a:r>
             <a:endParaRPr lang="en-IL" dirty="0"/>
           </a:p>
         </p:txBody>
@@ -24047,7 +24958,7 @@
           <a:p>
             <a:fld id="{4FAB73BC-B049-4115-A692-8D63A059BFB8}" type="slidenum">
               <a:rPr lang="en-US" smtClean="0"/>
-              <a:t>33</a:t>
+              <a:t>34</a:t>
             </a:fld>
             <a:endParaRPr lang="en-US" dirty="0"/>
           </a:p>

</xml_diff>